<commit_message>
parts in circuit diagramm added
</commit_message>
<xml_diff>
--- a/doc/raspberry_stromzähler.pptx
+++ b/doc/raspberry_stromzähler.pptx
@@ -6,7 +6,6 @@
   </p:sldMasterIdLst>
   <p:sldIdLst>
     <p:sldId id="256" r:id="rId2"/>
-    <p:sldId id="257" r:id="rId3"/>
   </p:sldIdLst>
   <p:sldSz cx="9144000" cy="6858000" type="screen4x3"/>
   <p:notesSz cx="6858000" cy="9144000"/>
@@ -290,7 +289,7 @@
             <a:fld id="{0DBD299B-675E-214E-8A3F-74CA5D9ECDB6}" type="datetimeFigureOut">
               <a:rPr lang="de-DE" smtClean="0"/>
               <a:pPr/>
-              <a:t>08.03.2013</a:t>
+              <a:t>03.05.2013</a:t>
             </a:fld>
             <a:endParaRPr lang="en-US"/>
           </a:p>
@@ -457,7 +456,7 @@
             <a:fld id="{0DBD299B-675E-214E-8A3F-74CA5D9ECDB6}" type="datetimeFigureOut">
               <a:rPr lang="de-DE" smtClean="0"/>
               <a:pPr/>
-              <a:t>08.03.2013</a:t>
+              <a:t>03.05.2013</a:t>
             </a:fld>
             <a:endParaRPr lang="en-US"/>
           </a:p>
@@ -634,7 +633,7 @@
             <a:fld id="{0DBD299B-675E-214E-8A3F-74CA5D9ECDB6}" type="datetimeFigureOut">
               <a:rPr lang="de-DE" smtClean="0"/>
               <a:pPr/>
-              <a:t>08.03.2013</a:t>
+              <a:t>03.05.2013</a:t>
             </a:fld>
             <a:endParaRPr lang="en-US"/>
           </a:p>
@@ -801,7 +800,7 @@
             <a:fld id="{0DBD299B-675E-214E-8A3F-74CA5D9ECDB6}" type="datetimeFigureOut">
               <a:rPr lang="de-DE" smtClean="0"/>
               <a:pPr/>
-              <a:t>08.03.2013</a:t>
+              <a:t>03.05.2013</a:t>
             </a:fld>
             <a:endParaRPr lang="en-US"/>
           </a:p>
@@ -1044,7 +1043,7 @@
             <a:fld id="{0DBD299B-675E-214E-8A3F-74CA5D9ECDB6}" type="datetimeFigureOut">
               <a:rPr lang="de-DE" smtClean="0"/>
               <a:pPr/>
-              <a:t>08.03.2013</a:t>
+              <a:t>03.05.2013</a:t>
             </a:fld>
             <a:endParaRPr lang="en-US"/>
           </a:p>
@@ -1329,7 +1328,7 @@
             <a:fld id="{0DBD299B-675E-214E-8A3F-74CA5D9ECDB6}" type="datetimeFigureOut">
               <a:rPr lang="de-DE" smtClean="0"/>
               <a:pPr/>
-              <a:t>08.03.2013</a:t>
+              <a:t>03.05.2013</a:t>
             </a:fld>
             <a:endParaRPr lang="en-US"/>
           </a:p>
@@ -1748,7 +1747,7 @@
             <a:fld id="{0DBD299B-675E-214E-8A3F-74CA5D9ECDB6}" type="datetimeFigureOut">
               <a:rPr lang="de-DE" smtClean="0"/>
               <a:pPr/>
-              <a:t>08.03.2013</a:t>
+              <a:t>03.05.2013</a:t>
             </a:fld>
             <a:endParaRPr lang="en-US"/>
           </a:p>
@@ -1863,7 +1862,7 @@
             <a:fld id="{0DBD299B-675E-214E-8A3F-74CA5D9ECDB6}" type="datetimeFigureOut">
               <a:rPr lang="de-DE" smtClean="0"/>
               <a:pPr/>
-              <a:t>08.03.2013</a:t>
+              <a:t>03.05.2013</a:t>
             </a:fld>
             <a:endParaRPr lang="en-US"/>
           </a:p>
@@ -1955,7 +1954,7 @@
             <a:fld id="{0DBD299B-675E-214E-8A3F-74CA5D9ECDB6}" type="datetimeFigureOut">
               <a:rPr lang="de-DE" smtClean="0"/>
               <a:pPr/>
-              <a:t>08.03.2013</a:t>
+              <a:t>03.05.2013</a:t>
             </a:fld>
             <a:endParaRPr lang="en-US"/>
           </a:p>
@@ -2229,7 +2228,7 @@
             <a:fld id="{0DBD299B-675E-214E-8A3F-74CA5D9ECDB6}" type="datetimeFigureOut">
               <a:rPr lang="de-DE" smtClean="0"/>
               <a:pPr/>
-              <a:t>08.03.2013</a:t>
+              <a:t>03.05.2013</a:t>
             </a:fld>
             <a:endParaRPr lang="en-US"/>
           </a:p>
@@ -2479,7 +2478,7 @@
             <a:fld id="{0DBD299B-675E-214E-8A3F-74CA5D9ECDB6}" type="datetimeFigureOut">
               <a:rPr lang="de-DE" smtClean="0"/>
               <a:pPr/>
-              <a:t>08.03.2013</a:t>
+              <a:t>03.05.2013</a:t>
             </a:fld>
             <a:endParaRPr lang="en-US"/>
           </a:p>
@@ -2689,7 +2688,7 @@
             <a:fld id="{0DBD299B-675E-214E-8A3F-74CA5D9ECDB6}" type="datetimeFigureOut">
               <a:rPr lang="de-DE" smtClean="0"/>
               <a:pPr/>
-              <a:t>08.03.2013</a:t>
+              <a:t>03.05.2013</a:t>
             </a:fld>
             <a:endParaRPr lang="en-US"/>
           </a:p>
@@ -5639,127 +5638,6 @@
 </p:sld>
 </file>
 
-<file path=ppt/slides/slide2.xml><?xml version="1.0" encoding="utf-8"?>
-<p:sld xmlns:a="http://schemas.openxmlformats.org/drawingml/2006/main" xmlns:r="http://schemas.openxmlformats.org/officeDocument/2006/relationships" xmlns:mc="http://schemas.openxmlformats.org/markup-compatibility/2006" xmlns:mv="urn:schemas-microsoft-com:mac:vml" xmlns:p="http://schemas.openxmlformats.org/presentationml/2006/main" mc:Ignorable="mv" mc:PreserveAttributes="mv:*">
-  <p:cSld>
-    <p:spTree>
-      <p:nvGrpSpPr>
-        <p:cNvPr id="1" name=""/>
-        <p:cNvGrpSpPr/>
-        <p:nvPr/>
-      </p:nvGrpSpPr>
-      <p:grpSpPr>
-        <a:xfrm>
-          <a:off x="0" y="0"/>
-          <a:ext cx="0" cy="0"/>
-          <a:chOff x="0" y="0"/>
-          <a:chExt cx="0" cy="0"/>
-        </a:xfrm>
-      </p:grpSpPr>
-      <p:pic>
-        <p:nvPicPr>
-          <p:cNvPr id="4" name="Bild 3"/>
-          <p:cNvPicPr>
-            <a:picLocks noChangeAspect="1"/>
-          </p:cNvPicPr>
-          <p:nvPr/>
-        </p:nvPicPr>
-        <p:blipFill>
-          <a:blip r:embed="rId2"/>
-          <a:stretch>
-            <a:fillRect/>
-          </a:stretch>
-        </p:blipFill>
-        <p:spPr>
-          <a:xfrm>
-            <a:off x="838199" y="1219200"/>
-            <a:ext cx="2981115" cy="1981200"/>
-          </a:xfrm>
-          <a:prstGeom prst="rect">
-            <a:avLst/>
-          </a:prstGeom>
-        </p:spPr>
-      </p:pic>
-      <p:pic>
-        <p:nvPicPr>
-          <p:cNvPr id="5" name="Bild 4"/>
-          <p:cNvPicPr>
-            <a:picLocks noChangeAspect="1"/>
-          </p:cNvPicPr>
-          <p:nvPr/>
-        </p:nvPicPr>
-        <p:blipFill>
-          <a:blip r:embed="rId3"/>
-          <a:stretch>
-            <a:fillRect/>
-          </a:stretch>
-        </p:blipFill>
-        <p:spPr>
-          <a:xfrm>
-            <a:off x="3819314" y="1219200"/>
-            <a:ext cx="2185272" cy="1981200"/>
-          </a:xfrm>
-          <a:prstGeom prst="rect">
-            <a:avLst/>
-          </a:prstGeom>
-        </p:spPr>
-      </p:pic>
-      <p:pic>
-        <p:nvPicPr>
-          <p:cNvPr id="6" name="Bild 5"/>
-          <p:cNvPicPr>
-            <a:picLocks noChangeAspect="1"/>
-          </p:cNvPicPr>
-          <p:nvPr/>
-        </p:nvPicPr>
-        <p:blipFill>
-          <a:blip r:embed="rId4"/>
-          <a:stretch>
-            <a:fillRect/>
-          </a:stretch>
-        </p:blipFill>
-        <p:spPr>
-          <a:xfrm>
-            <a:off x="6004586" y="1219200"/>
-            <a:ext cx="815024" cy="1981200"/>
-          </a:xfrm>
-          <a:prstGeom prst="rect">
-            <a:avLst/>
-          </a:prstGeom>
-        </p:spPr>
-      </p:pic>
-      <p:pic>
-        <p:nvPicPr>
-          <p:cNvPr id="7" name="Bild 6"/>
-          <p:cNvPicPr>
-            <a:picLocks noChangeAspect="1"/>
-          </p:cNvPicPr>
-          <p:nvPr/>
-        </p:nvPicPr>
-        <p:blipFill>
-          <a:blip r:embed="rId5"/>
-          <a:stretch>
-            <a:fillRect/>
-          </a:stretch>
-        </p:blipFill>
-        <p:spPr>
-          <a:xfrm>
-            <a:off x="6819610" y="1219200"/>
-            <a:ext cx="749767" cy="1981200"/>
-          </a:xfrm>
-          <a:prstGeom prst="rect">
-            <a:avLst/>
-          </a:prstGeom>
-        </p:spPr>
-      </p:pic>
-    </p:spTree>
-  </p:cSld>
-  <p:clrMapOvr>
-    <a:masterClrMapping/>
-  </p:clrMapOvr>
-</p:sld>
-</file>
-
 <file path=ppt/theme/theme1.xml><?xml version="1.0" encoding="utf-8"?>
 <a:theme xmlns:a="http://schemas.openxmlformats.org/drawingml/2006/main" name="Office-Design">
   <a:themeElements>

</xml_diff>